<commit_message>
last commit - project handed in
</commit_message>
<xml_diff>
--- a/participants.pptx
+++ b/participants.pptx
@@ -107,6 +107,11 @@
       </a:defRPr>
     </a:lvl9pPr>
   </p:defaultTextStyle>
+  <p:extLst>
+    <p:ext uri="{EFAFB233-063F-42B5-8137-9DF3F51BA10A}">
+      <p15:sldGuideLst xmlns:p15="http://schemas.microsoft.com/office/powerpoint/2012/main"/>
+    </p:ext>
+  </p:extLst>
 </p:presentation>
 </file>
 
@@ -192,7 +197,7 @@
           <a:p>
             <a:fld id="{CFF99C7B-F105-EB41-9A54-14267A668E5D}" type="datetimeFigureOut">
               <a:rPr lang="fr-FR" smtClean="0"/>
-              <a:t>23/02/2018</a:t>
+              <a:t>03/03/2018</a:t>
             </a:fld>
             <a:endParaRPr lang="fr-FR"/>
           </a:p>
@@ -591,7 +596,7 @@
           <a:p>
             <a:fld id="{DE08FAF5-9E6E-E146-8A31-6878ADCBCA44}" type="datetimeFigureOut">
               <a:rPr lang="fr-FR" smtClean="0"/>
-              <a:t>23/02/2018</a:t>
+              <a:t>03/03/2018</a:t>
             </a:fld>
             <a:endParaRPr lang="fr-FR"/>
           </a:p>
@@ -761,7 +766,7 @@
           <a:p>
             <a:fld id="{DE08FAF5-9E6E-E146-8A31-6878ADCBCA44}" type="datetimeFigureOut">
               <a:rPr lang="fr-FR" smtClean="0"/>
-              <a:t>23/02/2018</a:t>
+              <a:t>03/03/2018</a:t>
             </a:fld>
             <a:endParaRPr lang="fr-FR"/>
           </a:p>
@@ -941,7 +946,7 @@
           <a:p>
             <a:fld id="{DE08FAF5-9E6E-E146-8A31-6878ADCBCA44}" type="datetimeFigureOut">
               <a:rPr lang="fr-FR" smtClean="0"/>
-              <a:t>23/02/2018</a:t>
+              <a:t>03/03/2018</a:t>
             </a:fld>
             <a:endParaRPr lang="fr-FR"/>
           </a:p>
@@ -1111,7 +1116,7 @@
           <a:p>
             <a:fld id="{DE08FAF5-9E6E-E146-8A31-6878ADCBCA44}" type="datetimeFigureOut">
               <a:rPr lang="fr-FR" smtClean="0"/>
-              <a:t>23/02/2018</a:t>
+              <a:t>03/03/2018</a:t>
             </a:fld>
             <a:endParaRPr lang="fr-FR"/>
           </a:p>
@@ -1357,7 +1362,7 @@
           <a:p>
             <a:fld id="{DE08FAF5-9E6E-E146-8A31-6878ADCBCA44}" type="datetimeFigureOut">
               <a:rPr lang="fr-FR" smtClean="0"/>
-              <a:t>23/02/2018</a:t>
+              <a:t>03/03/2018</a:t>
             </a:fld>
             <a:endParaRPr lang="fr-FR"/>
           </a:p>
@@ -1589,7 +1594,7 @@
           <a:p>
             <a:fld id="{DE08FAF5-9E6E-E146-8A31-6878ADCBCA44}" type="datetimeFigureOut">
               <a:rPr lang="fr-FR" smtClean="0"/>
-              <a:t>23/02/2018</a:t>
+              <a:t>03/03/2018</a:t>
             </a:fld>
             <a:endParaRPr lang="fr-FR"/>
           </a:p>
@@ -1956,7 +1961,7 @@
           <a:p>
             <a:fld id="{DE08FAF5-9E6E-E146-8A31-6878ADCBCA44}" type="datetimeFigureOut">
               <a:rPr lang="fr-FR" smtClean="0"/>
-              <a:t>23/02/2018</a:t>
+              <a:t>03/03/2018</a:t>
             </a:fld>
             <a:endParaRPr lang="fr-FR"/>
           </a:p>
@@ -2074,7 +2079,7 @@
           <a:p>
             <a:fld id="{DE08FAF5-9E6E-E146-8A31-6878ADCBCA44}" type="datetimeFigureOut">
               <a:rPr lang="fr-FR" smtClean="0"/>
-              <a:t>23/02/2018</a:t>
+              <a:t>03/03/2018</a:t>
             </a:fld>
             <a:endParaRPr lang="fr-FR"/>
           </a:p>
@@ -2169,7 +2174,7 @@
           <a:p>
             <a:fld id="{DE08FAF5-9E6E-E146-8A31-6878ADCBCA44}" type="datetimeFigureOut">
               <a:rPr lang="fr-FR" smtClean="0"/>
-              <a:t>23/02/2018</a:t>
+              <a:t>03/03/2018</a:t>
             </a:fld>
             <a:endParaRPr lang="fr-FR"/>
           </a:p>
@@ -2446,7 +2451,7 @@
           <a:p>
             <a:fld id="{DE08FAF5-9E6E-E146-8A31-6878ADCBCA44}" type="datetimeFigureOut">
               <a:rPr lang="fr-FR" smtClean="0"/>
-              <a:t>23/02/2018</a:t>
+              <a:t>03/03/2018</a:t>
             </a:fld>
             <a:endParaRPr lang="fr-FR"/>
           </a:p>
@@ -2699,7 +2704,7 @@
           <a:p>
             <a:fld id="{DE08FAF5-9E6E-E146-8A31-6878ADCBCA44}" type="datetimeFigureOut">
               <a:rPr lang="fr-FR" smtClean="0"/>
-              <a:t>23/02/2018</a:t>
+              <a:t>03/03/2018</a:t>
             </a:fld>
             <a:endParaRPr lang="fr-FR"/>
           </a:p>
@@ -2912,7 +2917,7 @@
           <a:p>
             <a:fld id="{DE08FAF5-9E6E-E146-8A31-6878ADCBCA44}" type="datetimeFigureOut">
               <a:rPr lang="fr-FR" smtClean="0"/>
-              <a:t>23/02/2018</a:t>
+              <a:t>03/03/2018</a:t>
             </a:fld>
             <a:endParaRPr lang="fr-FR"/>
           </a:p>
@@ -3319,7 +3324,7 @@
       </p:grpSpPr>
       <p:pic>
         <p:nvPicPr>
-          <p:cNvPr id="51" name="Image 50"/>
+          <p:cNvPr id="2" name="Image 1"/>
           <p:cNvPicPr>
             <a:picLocks noChangeAspect="1"/>
           </p:cNvPicPr>
@@ -3339,8 +3344,8 @@
         </p:blipFill>
         <p:spPr>
           <a:xfrm>
-            <a:off x="5512725" y="150436"/>
-            <a:ext cx="3693468" cy="2760449"/>
+            <a:off x="238147" y="4288404"/>
+            <a:ext cx="3888854" cy="2236091"/>
           </a:xfrm>
           <a:prstGeom prst="rect">
             <a:avLst/>
@@ -3349,7 +3354,7 @@
       </p:pic>
       <p:pic>
         <p:nvPicPr>
-          <p:cNvPr id="48" name="Image 47"/>
+          <p:cNvPr id="51" name="Image 50"/>
           <p:cNvPicPr>
             <a:picLocks noChangeAspect="1"/>
           </p:cNvPicPr>
@@ -3369,8 +3374,8 @@
         </p:blipFill>
         <p:spPr>
           <a:xfrm>
-            <a:off x="311039" y="4035293"/>
-            <a:ext cx="3824231" cy="2858180"/>
+            <a:off x="5512725" y="150436"/>
+            <a:ext cx="3693468" cy="2760449"/>
           </a:xfrm>
           <a:prstGeom prst="rect">
             <a:avLst/>

</xml_diff>